<commit_message>
changed: UI, canales Agilent, calculo velocidad aire
</commit_message>
<xml_diff>
--- a/DOCUMENTOS/SECADO.pptx
+++ b/DOCUMENTOS/SECADO.pptx
@@ -15,7 +15,8 @@
     <p:sldId id="258" r:id="rId9"/>
     <p:sldId id="259" r:id="rId10"/>
     <p:sldId id="260" r:id="rId11"/>
-    <p:sldId id="257" r:id="rId12"/>
+    <p:sldId id="268" r:id="rId12"/>
+    <p:sldId id="267" r:id="rId13"/>
   </p:sldIdLst>
   <p:sldSz cx="12192000" cy="6858000"/>
   <p:notesSz cx="6858000" cy="9144000"/>
@@ -457,7 +458,7 @@
           <a:p>
             <a:fld id="{2D7B06BA-A28F-4D05-9C40-BAB256417D71}" type="datetimeFigureOut">
               <a:rPr lang="es-ES" smtClean="0"/>
-              <a:t>08/01/2025</a:t>
+              <a:t>13/01/2025</a:t>
             </a:fld>
             <a:endParaRPr lang="es-ES"/>
           </a:p>
@@ -655,7 +656,7 @@
           <a:p>
             <a:fld id="{2D7B06BA-A28F-4D05-9C40-BAB256417D71}" type="datetimeFigureOut">
               <a:rPr lang="es-ES" smtClean="0"/>
-              <a:t>08/01/2025</a:t>
+              <a:t>13/01/2025</a:t>
             </a:fld>
             <a:endParaRPr lang="es-ES"/>
           </a:p>
@@ -863,7 +864,7 @@
           <a:p>
             <a:fld id="{2D7B06BA-A28F-4D05-9C40-BAB256417D71}" type="datetimeFigureOut">
               <a:rPr lang="es-ES" smtClean="0"/>
-              <a:t>08/01/2025</a:t>
+              <a:t>13/01/2025</a:t>
             </a:fld>
             <a:endParaRPr lang="es-ES"/>
           </a:p>
@@ -1061,7 +1062,7 @@
           <a:p>
             <a:fld id="{2D7B06BA-A28F-4D05-9C40-BAB256417D71}" type="datetimeFigureOut">
               <a:rPr lang="es-ES" smtClean="0"/>
-              <a:t>08/01/2025</a:t>
+              <a:t>13/01/2025</a:t>
             </a:fld>
             <a:endParaRPr lang="es-ES"/>
           </a:p>
@@ -1336,7 +1337,7 @@
           <a:p>
             <a:fld id="{2D7B06BA-A28F-4D05-9C40-BAB256417D71}" type="datetimeFigureOut">
               <a:rPr lang="es-ES" smtClean="0"/>
-              <a:t>08/01/2025</a:t>
+              <a:t>13/01/2025</a:t>
             </a:fld>
             <a:endParaRPr lang="es-ES"/>
           </a:p>
@@ -1601,7 +1602,7 @@
           <a:p>
             <a:fld id="{2D7B06BA-A28F-4D05-9C40-BAB256417D71}" type="datetimeFigureOut">
               <a:rPr lang="es-ES" smtClean="0"/>
-              <a:t>08/01/2025</a:t>
+              <a:t>13/01/2025</a:t>
             </a:fld>
             <a:endParaRPr lang="es-ES"/>
           </a:p>
@@ -2013,7 +2014,7 @@
           <a:p>
             <a:fld id="{2D7B06BA-A28F-4D05-9C40-BAB256417D71}" type="datetimeFigureOut">
               <a:rPr lang="es-ES" smtClean="0"/>
-              <a:t>08/01/2025</a:t>
+              <a:t>13/01/2025</a:t>
             </a:fld>
             <a:endParaRPr lang="es-ES"/>
           </a:p>
@@ -2154,7 +2155,7 @@
           <a:p>
             <a:fld id="{2D7B06BA-A28F-4D05-9C40-BAB256417D71}" type="datetimeFigureOut">
               <a:rPr lang="es-ES" smtClean="0"/>
-              <a:t>08/01/2025</a:t>
+              <a:t>13/01/2025</a:t>
             </a:fld>
             <a:endParaRPr lang="es-ES"/>
           </a:p>
@@ -2267,7 +2268,7 @@
           <a:p>
             <a:fld id="{2D7B06BA-A28F-4D05-9C40-BAB256417D71}" type="datetimeFigureOut">
               <a:rPr lang="es-ES" smtClean="0"/>
-              <a:t>08/01/2025</a:t>
+              <a:t>13/01/2025</a:t>
             </a:fld>
             <a:endParaRPr lang="es-ES"/>
           </a:p>
@@ -2578,7 +2579,7 @@
           <a:p>
             <a:fld id="{2D7B06BA-A28F-4D05-9C40-BAB256417D71}" type="datetimeFigureOut">
               <a:rPr lang="es-ES" smtClean="0"/>
-              <a:t>08/01/2025</a:t>
+              <a:t>13/01/2025</a:t>
             </a:fld>
             <a:endParaRPr lang="es-ES"/>
           </a:p>
@@ -2866,7 +2867,7 @@
           <a:p>
             <a:fld id="{2D7B06BA-A28F-4D05-9C40-BAB256417D71}" type="datetimeFigureOut">
               <a:rPr lang="es-ES" smtClean="0"/>
-              <a:t>08/01/2025</a:t>
+              <a:t>13/01/2025</a:t>
             </a:fld>
             <a:endParaRPr lang="es-ES"/>
           </a:p>
@@ -3107,7 +3108,7 @@
           <a:p>
             <a:fld id="{2D7B06BA-A28F-4D05-9C40-BAB256417D71}" type="datetimeFigureOut">
               <a:rPr lang="es-ES" smtClean="0"/>
-              <a:t>08/01/2025</a:t>
+              <a:t>13/01/2025</a:t>
             </a:fld>
             <a:endParaRPr lang="es-ES"/>
           </a:p>
@@ -3526,10 +3527,10 @@
       </p:grpSpPr>
       <p:pic>
         <p:nvPicPr>
-          <p:cNvPr id="5" name="Imagen 4">
-            <a:extLst>
-              <a:ext uri="{FF2B5EF4-FFF2-40B4-BE49-F238E27FC236}">
-                <a16:creationId xmlns:a16="http://schemas.microsoft.com/office/drawing/2014/main" id="{A46DEA5B-3B8F-0EE4-782C-71E1A3360600}"/>
+          <p:cNvPr id="6" name="Imagen 5">
+            <a:extLst>
+              <a:ext uri="{FF2B5EF4-FFF2-40B4-BE49-F238E27FC236}">
+                <a16:creationId xmlns:a16="http://schemas.microsoft.com/office/drawing/2014/main" id="{BB1EB4E3-5F4F-C8D4-2AD5-5719E9235521}"/>
               </a:ext>
             </a:extLst>
           </p:cNvPr>
@@ -3546,8 +3547,8 @@
         </p:blipFill>
         <p:spPr>
           <a:xfrm>
-            <a:off x="1264885" y="230680"/>
-            <a:ext cx="9555515" cy="6468884"/>
+            <a:off x="956545" y="204337"/>
+            <a:ext cx="10278909" cy="6449325"/>
           </a:xfrm>
           <a:prstGeom prst="rect">
             <a:avLst/>
@@ -3586,10 +3587,10 @@
       </p:grpSpPr>
       <p:pic>
         <p:nvPicPr>
-          <p:cNvPr id="3" name="Imagen 2">
-            <a:extLst>
-              <a:ext uri="{FF2B5EF4-FFF2-40B4-BE49-F238E27FC236}">
-                <a16:creationId xmlns:a16="http://schemas.microsoft.com/office/drawing/2014/main" id="{6103569F-0252-3492-C25B-8C1BC8081628}"/>
+          <p:cNvPr id="4" name="Imagen 3">
+            <a:extLst>
+              <a:ext uri="{FF2B5EF4-FFF2-40B4-BE49-F238E27FC236}">
+                <a16:creationId xmlns:a16="http://schemas.microsoft.com/office/drawing/2014/main" id="{F391D72F-5566-0CA6-7006-47ACEC92B34B}"/>
               </a:ext>
             </a:extLst>
           </p:cNvPr>
@@ -3606,8 +3607,8 @@
         </p:blipFill>
         <p:spPr>
           <a:xfrm>
-            <a:off x="908913" y="1900024"/>
-            <a:ext cx="10374173" cy="3057952"/>
+            <a:off x="1918704" y="2081024"/>
+            <a:ext cx="8354591" cy="2695951"/>
           </a:xfrm>
           <a:prstGeom prst="rect">
             <a:avLst/>
@@ -3646,10 +3647,10 @@
       </p:grpSpPr>
       <p:pic>
         <p:nvPicPr>
-          <p:cNvPr id="5" name="Imagen 4">
-            <a:extLst>
-              <a:ext uri="{FF2B5EF4-FFF2-40B4-BE49-F238E27FC236}">
-                <a16:creationId xmlns:a16="http://schemas.microsoft.com/office/drawing/2014/main" id="{6C4AF96F-B4FE-06EB-EA4D-EBD91C425FA5}"/>
+          <p:cNvPr id="3" name="Imagen 2">
+            <a:extLst>
+              <a:ext uri="{FF2B5EF4-FFF2-40B4-BE49-F238E27FC236}">
+                <a16:creationId xmlns:a16="http://schemas.microsoft.com/office/drawing/2014/main" id="{396E9469-714B-8278-89A4-3FE54B948855}"/>
               </a:ext>
             </a:extLst>
           </p:cNvPr>
@@ -3666,8 +3667,8 @@
         </p:blipFill>
         <p:spPr>
           <a:xfrm>
-            <a:off x="238124" y="641854"/>
-            <a:ext cx="11811001" cy="5682746"/>
+            <a:off x="1895474" y="1619431"/>
+            <a:ext cx="7839075" cy="3377041"/>
           </a:xfrm>
           <a:prstGeom prst="rect">
             <a:avLst/>
@@ -3677,7 +3678,73 @@
     </p:spTree>
     <p:extLst>
       <p:ext uri="{BB962C8B-B14F-4D97-AF65-F5344CB8AC3E}">
-        <p14:creationId xmlns:p14="http://schemas.microsoft.com/office/powerpoint/2010/main" val="465295435"/>
+        <p14:creationId xmlns:p14="http://schemas.microsoft.com/office/powerpoint/2010/main" val="3091067063"/>
+      </p:ext>
+    </p:extLst>
+  </p:cSld>
+  <p:clrMapOvr>
+    <a:masterClrMapping/>
+  </p:clrMapOvr>
+</p:sld>
+</file>
+
+<file path=ppt/slides/slide12.xml><?xml version="1.0" encoding="utf-8"?>
+<p:sld xmlns:a="http://schemas.openxmlformats.org/drawingml/2006/main" xmlns:r="http://schemas.openxmlformats.org/officeDocument/2006/relationships" xmlns:p="http://schemas.openxmlformats.org/presentationml/2006/main">
+  <p:cSld>
+    <p:spTree>
+      <p:nvGrpSpPr>
+        <p:cNvPr id="1" name="">
+          <a:extLst>
+            <a:ext uri="{FF2B5EF4-FFF2-40B4-BE49-F238E27FC236}">
+              <a16:creationId xmlns:a16="http://schemas.microsoft.com/office/drawing/2014/main" id="{5921C364-D1F1-33F9-9315-5E6D45554728}"/>
+            </a:ext>
+          </a:extLst>
+        </p:cNvPr>
+        <p:cNvGrpSpPr/>
+        <p:nvPr/>
+      </p:nvGrpSpPr>
+      <p:grpSpPr>
+        <a:xfrm>
+          <a:off x="0" y="0"/>
+          <a:ext cx="0" cy="0"/>
+          <a:chOff x="0" y="0"/>
+          <a:chExt cx="0" cy="0"/>
+        </a:xfrm>
+      </p:grpSpPr>
+      <p:pic>
+        <p:nvPicPr>
+          <p:cNvPr id="3" name="Imagen 2">
+            <a:extLst>
+              <a:ext uri="{FF2B5EF4-FFF2-40B4-BE49-F238E27FC236}">
+                <a16:creationId xmlns:a16="http://schemas.microsoft.com/office/drawing/2014/main" id="{DAE61B63-1DEF-1119-649A-9628DFE398DC}"/>
+              </a:ext>
+            </a:extLst>
+          </p:cNvPr>
+          <p:cNvPicPr>
+            <a:picLocks noChangeAspect="1"/>
+          </p:cNvPicPr>
+          <p:nvPr/>
+        </p:nvPicPr>
+        <p:blipFill>
+          <a:blip r:embed="rId2"/>
+          <a:stretch>
+            <a:fillRect/>
+          </a:stretch>
+        </p:blipFill>
+        <p:spPr>
+          <a:xfrm>
+            <a:off x="525902" y="734859"/>
+            <a:ext cx="11273545" cy="5121581"/>
+          </a:xfrm>
+          <a:prstGeom prst="rect">
+            <a:avLst/>
+          </a:prstGeom>
+        </p:spPr>
+      </p:pic>
+    </p:spTree>
+    <p:extLst>
+      <p:ext uri="{BB962C8B-B14F-4D97-AF65-F5344CB8AC3E}">
+        <p14:creationId xmlns:p14="http://schemas.microsoft.com/office/powerpoint/2010/main" val="853541764"/>
       </p:ext>
     </p:extLst>
   </p:cSld>
@@ -3826,10 +3893,10 @@
       </p:grpSpPr>
       <p:pic>
         <p:nvPicPr>
-          <p:cNvPr id="3" name="Imagen 2">
-            <a:extLst>
-              <a:ext uri="{FF2B5EF4-FFF2-40B4-BE49-F238E27FC236}">
-                <a16:creationId xmlns:a16="http://schemas.microsoft.com/office/drawing/2014/main" id="{F023DE3D-3E7E-BFC1-AE84-9C87343E6C88}"/>
+          <p:cNvPr id="6" name="Imagen 5">
+            <a:extLst>
+              <a:ext uri="{FF2B5EF4-FFF2-40B4-BE49-F238E27FC236}">
+                <a16:creationId xmlns:a16="http://schemas.microsoft.com/office/drawing/2014/main" id="{140E7779-B101-21F5-1B23-787AD8AC19FC}"/>
               </a:ext>
             </a:extLst>
           </p:cNvPr>
@@ -3846,8 +3913,8 @@
         </p:blipFill>
         <p:spPr>
           <a:xfrm>
-            <a:off x="1202702" y="316870"/>
-            <a:ext cx="9465453" cy="6396273"/>
+            <a:off x="951782" y="190048"/>
+            <a:ext cx="10288436" cy="6477904"/>
           </a:xfrm>
           <a:prstGeom prst="rect">
             <a:avLst/>
@@ -3886,10 +3953,10 @@
       </p:grpSpPr>
       <p:pic>
         <p:nvPicPr>
-          <p:cNvPr id="3" name="Imagen 2">
-            <a:extLst>
-              <a:ext uri="{FF2B5EF4-FFF2-40B4-BE49-F238E27FC236}">
-                <a16:creationId xmlns:a16="http://schemas.microsoft.com/office/drawing/2014/main" id="{E71298BA-9C37-1D2D-6976-E17CD01D24D6}"/>
+          <p:cNvPr id="4" name="Imagen 3">
+            <a:extLst>
+              <a:ext uri="{FF2B5EF4-FFF2-40B4-BE49-F238E27FC236}">
+                <a16:creationId xmlns:a16="http://schemas.microsoft.com/office/drawing/2014/main" id="{9E6EE7EB-04A5-609E-56E8-A40105A2A59B}"/>
               </a:ext>
             </a:extLst>
           </p:cNvPr>
@@ -3906,8 +3973,8 @@
         </p:blipFill>
         <p:spPr>
           <a:xfrm>
-            <a:off x="1204192" y="262219"/>
-            <a:ext cx="10101983" cy="6333561"/>
+            <a:off x="1064060" y="284622"/>
+            <a:ext cx="10063879" cy="6288756"/>
           </a:xfrm>
           <a:prstGeom prst="rect">
             <a:avLst/>
@@ -3946,10 +4013,10 @@
       </p:grpSpPr>
       <p:pic>
         <p:nvPicPr>
-          <p:cNvPr id="3" name="Imagen 2">
-            <a:extLst>
-              <a:ext uri="{FF2B5EF4-FFF2-40B4-BE49-F238E27FC236}">
-                <a16:creationId xmlns:a16="http://schemas.microsoft.com/office/drawing/2014/main" id="{EADA5105-357E-98C2-90CD-89D8C30666DC}"/>
+          <p:cNvPr id="4" name="Imagen 3">
+            <a:extLst>
+              <a:ext uri="{FF2B5EF4-FFF2-40B4-BE49-F238E27FC236}">
+                <a16:creationId xmlns:a16="http://schemas.microsoft.com/office/drawing/2014/main" id="{297322E1-8655-059A-8789-6AB1BE6FFAA7}"/>
               </a:ext>
             </a:extLst>
           </p:cNvPr>
@@ -3966,8 +4033,8 @@
         </p:blipFill>
         <p:spPr>
           <a:xfrm>
-            <a:off x="2695100" y="1133154"/>
-            <a:ext cx="6801799" cy="4591691"/>
+            <a:off x="2799890" y="1447523"/>
+            <a:ext cx="6592220" cy="3962953"/>
           </a:xfrm>
           <a:prstGeom prst="rect">
             <a:avLst/>

</xml_diff>